<commit_message>
Adatbázis kezelés és kisebb dolgok
</commit_message>
<xml_diff>
--- a/Documents/Aliasly bemutató.pptx
+++ b/Documents/Aliasly bemutató.pptx
@@ -10,14 +10,15 @@
     <p:sldId id="259" r:id="rId4"/>
     <p:sldId id="260" r:id="rId5"/>
     <p:sldId id="273" r:id="rId6"/>
-    <p:sldId id="262" r:id="rId7"/>
-    <p:sldId id="276" r:id="rId8"/>
-    <p:sldId id="274" r:id="rId9"/>
-    <p:sldId id="270" r:id="rId10"/>
-    <p:sldId id="275" r:id="rId11"/>
-    <p:sldId id="277" r:id="rId12"/>
-    <p:sldId id="272" r:id="rId13"/>
-    <p:sldId id="258" r:id="rId14"/>
+    <p:sldId id="278" r:id="rId7"/>
+    <p:sldId id="262" r:id="rId8"/>
+    <p:sldId id="276" r:id="rId9"/>
+    <p:sldId id="274" r:id="rId10"/>
+    <p:sldId id="270" r:id="rId11"/>
+    <p:sldId id="275" r:id="rId12"/>
+    <p:sldId id="277" r:id="rId13"/>
+    <p:sldId id="272" r:id="rId14"/>
+    <p:sldId id="258" r:id="rId15"/>
   </p:sldIdLst>
   <p:sldSz cx="12192000" cy="6858000"/>
   <p:notesSz cx="6858000" cy="9144000"/>
@@ -626,7 +627,7 @@
           <a:p>
             <a:fld id="{163A9885-A084-459B-8936-306554F04435}" type="datetimeFigureOut">
               <a:rPr lang="en-US" smtClean="0"/>
-              <a:t>3/20/2025</a:t>
+              <a:t>25-Mar-25</a:t>
             </a:fld>
             <a:endParaRPr lang="en-US"/>
           </a:p>
@@ -921,7 +922,7 @@
           <a:p>
             <a:fld id="{163A9885-A084-459B-8936-306554F04435}" type="datetimeFigureOut">
               <a:rPr lang="en-US" smtClean="0"/>
-              <a:t>3/20/2025</a:t>
+              <a:t>25-Mar-25</a:t>
             </a:fld>
             <a:endParaRPr lang="en-US"/>
           </a:p>
@@ -1169,7 +1170,7 @@
           <a:p>
             <a:fld id="{163A9885-A084-459B-8936-306554F04435}" type="datetimeFigureOut">
               <a:rPr lang="en-US" smtClean="0"/>
-              <a:t>3/20/2025</a:t>
+              <a:t>25-Mar-25</a:t>
             </a:fld>
             <a:endParaRPr lang="en-US"/>
           </a:p>
@@ -1709,7 +1710,7 @@
           <a:p>
             <a:fld id="{163A9885-A084-459B-8936-306554F04435}" type="datetimeFigureOut">
               <a:rPr lang="en-US" smtClean="0"/>
-              <a:t>3/20/2025</a:t>
+              <a:t>25-Mar-25</a:t>
             </a:fld>
             <a:endParaRPr lang="en-US"/>
           </a:p>
@@ -1957,7 +1958,7 @@
           <a:p>
             <a:fld id="{163A9885-A084-459B-8936-306554F04435}" type="datetimeFigureOut">
               <a:rPr lang="en-US" smtClean="0"/>
-              <a:t>3/20/2025</a:t>
+              <a:t>25-Mar-25</a:t>
             </a:fld>
             <a:endParaRPr lang="en-US"/>
           </a:p>
@@ -2489,7 +2490,7 @@
           <a:p>
             <a:fld id="{163A9885-A084-459B-8936-306554F04435}" type="datetimeFigureOut">
               <a:rPr lang="en-US" smtClean="0"/>
-              <a:t>3/20/2025</a:t>
+              <a:t>25-Mar-25</a:t>
             </a:fld>
             <a:endParaRPr lang="en-US"/>
           </a:p>
@@ -2786,7 +2787,7 @@
           <a:p>
             <a:fld id="{163A9885-A084-459B-8936-306554F04435}" type="datetimeFigureOut">
               <a:rPr lang="en-US" smtClean="0"/>
-              <a:t>3/20/2025</a:t>
+              <a:t>25-Mar-25</a:t>
             </a:fld>
             <a:endParaRPr lang="en-US"/>
           </a:p>
@@ -2960,7 +2961,7 @@
           <a:p>
             <a:fld id="{163A9885-A084-459B-8936-306554F04435}" type="datetimeFigureOut">
               <a:rPr lang="en-US" smtClean="0"/>
-              <a:t>3/20/2025</a:t>
+              <a:t>25-Mar-25</a:t>
             </a:fld>
             <a:endParaRPr lang="en-US"/>
           </a:p>
@@ -3140,7 +3141,7 @@
           <a:p>
             <a:fld id="{163A9885-A084-459B-8936-306554F04435}" type="datetimeFigureOut">
               <a:rPr lang="en-US" smtClean="0"/>
-              <a:t>3/20/2025</a:t>
+              <a:t>25-Mar-25</a:t>
             </a:fld>
             <a:endParaRPr lang="en-US"/>
           </a:p>
@@ -3310,7 +3311,7 @@
           <a:p>
             <a:fld id="{163A9885-A084-459B-8936-306554F04435}" type="datetimeFigureOut">
               <a:rPr lang="en-US" smtClean="0"/>
-              <a:t>3/20/2025</a:t>
+              <a:t>25-Mar-25</a:t>
             </a:fld>
             <a:endParaRPr lang="en-US"/>
           </a:p>
@@ -3561,7 +3562,7 @@
           <a:p>
             <a:fld id="{163A9885-A084-459B-8936-306554F04435}" type="datetimeFigureOut">
               <a:rPr lang="en-US" smtClean="0"/>
-              <a:t>3/20/2025</a:t>
+              <a:t>25-Mar-25</a:t>
             </a:fld>
             <a:endParaRPr lang="en-US"/>
           </a:p>
@@ -3858,7 +3859,7 @@
           <a:p>
             <a:fld id="{163A9885-A084-459B-8936-306554F04435}" type="datetimeFigureOut">
               <a:rPr lang="en-US" smtClean="0"/>
-              <a:t>3/20/2025</a:t>
+              <a:t>25-Mar-25</a:t>
             </a:fld>
             <a:endParaRPr lang="en-US"/>
           </a:p>
@@ -4300,7 +4301,7 @@
           <a:p>
             <a:fld id="{163A9885-A084-459B-8936-306554F04435}" type="datetimeFigureOut">
               <a:rPr lang="en-US" smtClean="0"/>
-              <a:t>3/20/2025</a:t>
+              <a:t>25-Mar-25</a:t>
             </a:fld>
             <a:endParaRPr lang="en-US"/>
           </a:p>
@@ -4418,7 +4419,7 @@
           <a:p>
             <a:fld id="{163A9885-A084-459B-8936-306554F04435}" type="datetimeFigureOut">
               <a:rPr lang="en-US" smtClean="0"/>
-              <a:t>3/20/2025</a:t>
+              <a:t>25-Mar-25</a:t>
             </a:fld>
             <a:endParaRPr lang="en-US"/>
           </a:p>
@@ -4513,7 +4514,7 @@
           <a:p>
             <a:fld id="{163A9885-A084-459B-8936-306554F04435}" type="datetimeFigureOut">
               <a:rPr lang="en-US" smtClean="0"/>
-              <a:t>3/20/2025</a:t>
+              <a:t>25-Mar-25</a:t>
             </a:fld>
             <a:endParaRPr lang="en-US"/>
           </a:p>
@@ -4796,7 +4797,7 @@
           <a:p>
             <a:fld id="{163A9885-A084-459B-8936-306554F04435}" type="datetimeFigureOut">
               <a:rPr lang="en-US" smtClean="0"/>
-              <a:t>3/20/2025</a:t>
+              <a:t>25-Mar-25</a:t>
             </a:fld>
             <a:endParaRPr lang="en-US"/>
           </a:p>
@@ -5086,7 +5087,7 @@
           <a:p>
             <a:fld id="{163A9885-A084-459B-8936-306554F04435}" type="datetimeFigureOut">
               <a:rPr lang="en-US" smtClean="0"/>
-              <a:t>3/20/2025</a:t>
+              <a:t>25-Mar-25</a:t>
             </a:fld>
             <a:endParaRPr lang="en-US"/>
           </a:p>
@@ -5616,7 +5617,7 @@
           <a:p>
             <a:fld id="{163A9885-A084-459B-8936-306554F04435}" type="datetimeFigureOut">
               <a:rPr lang="en-US" smtClean="0"/>
-              <a:t>3/20/2025</a:t>
+              <a:t>25-Mar-25</a:t>
             </a:fld>
             <a:endParaRPr lang="en-US"/>
           </a:p>
@@ -6416,13 +6417,7 @@
   <p:cSld>
     <p:spTree>
       <p:nvGrpSpPr>
-        <p:cNvPr id="1" name="">
-          <a:extLst>
-            <a:ext uri="{FF2B5EF4-FFF2-40B4-BE49-F238E27FC236}">
-              <a16:creationId xmlns:a16="http://schemas.microsoft.com/office/drawing/2014/main" id="{C903DE96-B4CD-BDD2-5BA0-BD4C2870AACF}"/>
-            </a:ext>
-          </a:extLst>
-        </p:cNvPr>
+        <p:cNvPr id="1" name=""/>
         <p:cNvGrpSpPr/>
         <p:nvPr/>
       </p:nvGrpSpPr>
@@ -6439,7 +6434,7 @@
           <p:cNvPr id="2" name="Cím 1">
             <a:extLst>
               <a:ext uri="{FF2B5EF4-FFF2-40B4-BE49-F238E27FC236}">
-                <a16:creationId xmlns:a16="http://schemas.microsoft.com/office/drawing/2014/main" id="{61FF2A9F-F474-F8F2-72A7-B596A78A95F6}"/>
+                <a16:creationId xmlns:a16="http://schemas.microsoft.com/office/drawing/2014/main" id="{E2BE7F50-CA2D-1C18-13B0-CEF53888A230}"/>
               </a:ext>
             </a:extLst>
           </p:cNvPr>
@@ -6474,7 +6469,7 @@
           <p:cNvPr id="3" name="Tartalom helye 2">
             <a:extLst>
               <a:ext uri="{FF2B5EF4-FFF2-40B4-BE49-F238E27FC236}">
-                <a16:creationId xmlns:a16="http://schemas.microsoft.com/office/drawing/2014/main" id="{203456BF-A70F-250B-C128-3FE710683D9B}"/>
+                <a16:creationId xmlns:a16="http://schemas.microsoft.com/office/drawing/2014/main" id="{C3401062-2977-BEA7-4528-A2223E6294F9}"/>
               </a:ext>
             </a:extLst>
           </p:cNvPr>
@@ -6501,34 +6496,67 @@
               <a:buNone/>
             </a:pPr>
             <a:r>
+              <a:rPr lang="hu-HU" sz="2800" b="1" noProof="0" dirty="0"/>
+              <a:t>Bejelentkezés</a:t>
+            </a:r>
+          </a:p>
+          <a:p>
+            <a:pPr marL="0" indent="0">
+              <a:buNone/>
+            </a:pPr>
+            <a:r>
+              <a:rPr lang="hu-HU" sz="2800" dirty="0"/>
+              <a:t>Az Aliasly használatához szükséges egy </a:t>
+            </a:r>
+            <a:r>
               <a:rPr lang="hu-HU" sz="2800" b="1" dirty="0"/>
-              <a:t>Felhasználói fiókok</a:t>
-            </a:r>
-            <a:endParaRPr lang="hu-HU" sz="2800" b="1" noProof="0" dirty="0"/>
+              <a:t>egyedi mesterkulcs</a:t>
+            </a:r>
+            <a:r>
+              <a:rPr lang="hu-HU" sz="2800" dirty="0"/>
+              <a:t>, amelyet ön határoz meg és hozhat létre az alkalmazás belépő felületén. </a:t>
+            </a:r>
           </a:p>
           <a:p>
             <a:pPr marL="0" indent="0">
               <a:buNone/>
             </a:pPr>
             <a:r>
+              <a:rPr lang="hu-HU" sz="2800" noProof="0" dirty="0"/>
+              <a:t>A </a:t>
+            </a:r>
+            <a:r>
+              <a:rPr lang="hu-HU" sz="2800" b="1" noProof="0" dirty="0"/>
+              <a:t>mesterkulcshoz</a:t>
+            </a:r>
+            <a:r>
+              <a:rPr lang="hu-HU" sz="2800" noProof="0" dirty="0"/>
+              <a:t> vannak rendelve a </a:t>
+            </a:r>
+            <a:r>
+              <a:rPr lang="hu-HU" sz="2800" b="1" noProof="0" dirty="0"/>
+              <a:t>felhasználói fiókok</a:t>
+            </a:r>
+            <a:r>
+              <a:rPr lang="hu-HU" sz="2800" noProof="0" dirty="0"/>
+              <a:t>.</a:t>
+            </a:r>
+          </a:p>
+          <a:p>
+            <a:pPr marL="0" indent="0">
+              <a:buNone/>
+            </a:pPr>
+            <a:r>
               <a:rPr lang="hu-HU" sz="2800" dirty="0"/>
-              <a:t>A felhasználókról tárolt adatok </a:t>
+              <a:t>A </a:t>
             </a:r>
             <a:r>
               <a:rPr lang="hu-HU" sz="2800" b="1" dirty="0"/>
-              <a:t>AES</a:t>
+              <a:t>mesterkulcsot</a:t>
             </a:r>
             <a:r>
               <a:rPr lang="hu-HU" sz="2800" dirty="0"/>
-              <a:t> encrypt –tel  kerülnek be az adatbázisba amihez a kulcs maga a </a:t>
-            </a:r>
-            <a:r>
-              <a:rPr lang="hu-HU" sz="2800" b="1" dirty="0"/>
-              <a:t>mesterkulcs</a:t>
-            </a:r>
-            <a:r>
-              <a:rPr lang="hu-HU" sz="2800" dirty="0"/>
-              <a:t>.</a:t>
+              <a:t> MD5 + Salting kombinációjával hasheljük.</a:t>
             </a:r>
             <a:r>
               <a:rPr lang="hu-HU" dirty="0"/>
@@ -6544,7 +6572,7 @@
     </p:spTree>
     <p:extLst>
       <p:ext uri="{BB962C8B-B14F-4D97-AF65-F5344CB8AC3E}">
-        <p14:creationId xmlns:p14="http://schemas.microsoft.com/office/powerpoint/2010/main" val="2766645718"/>
+        <p14:creationId xmlns:p14="http://schemas.microsoft.com/office/powerpoint/2010/main" val="2872949862"/>
       </p:ext>
     </p:extLst>
   </p:cSld>
@@ -6632,30 +6660,21 @@
                             </p:childTnLst>
                           </p:cTn>
                         </p:par>
-                      </p:childTnLst>
-                    </p:cTn>
-                  </p:par>
-                  <p:par>
-                    <p:cTn id="8" fill="hold">
-                      <p:stCondLst>
-                        <p:cond delay="indefinite"/>
-                      </p:stCondLst>
-                      <p:childTnLst>
                         <p:par>
-                          <p:cTn id="9" fill="hold">
+                          <p:cTn id="8" fill="hold">
                             <p:stCondLst>
-                              <p:cond delay="0"/>
+                              <p:cond delay="500"/>
                             </p:stCondLst>
                             <p:childTnLst>
                               <p:par>
-                                <p:cTn id="10" presetID="10" presetClass="entr" presetSubtype="0" fill="hold" grpId="0" nodeType="clickEffect">
+                                <p:cTn id="9" presetID="10" presetClass="entr" presetSubtype="0" fill="hold" grpId="0" nodeType="afterEffect">
                                   <p:stCondLst>
                                     <p:cond delay="0"/>
                                   </p:stCondLst>
                                   <p:childTnLst>
                                     <p:set>
                                       <p:cBhvr>
-                                        <p:cTn id="11" dur="1" fill="hold">
+                                        <p:cTn id="10" dur="1" fill="hold">
                                           <p:stCondLst>
                                             <p:cond delay="0"/>
                                           </p:stCondLst>
@@ -6677,11 +6696,115 @@
                                     </p:set>
                                     <p:animEffect transition="in" filter="fade">
                                       <p:cBhvr>
-                                        <p:cTn id="12" dur="500"/>
+                                        <p:cTn id="11" dur="500"/>
                                         <p:tgtEl>
                                           <p:spTgt spid="3">
                                             <p:txEl>
                                               <p:pRg st="1" end="1"/>
+                                            </p:txEl>
+                                          </p:spTgt>
+                                        </p:tgtEl>
+                                      </p:cBhvr>
+                                    </p:animEffect>
+                                  </p:childTnLst>
+                                </p:cTn>
+                              </p:par>
+                            </p:childTnLst>
+                          </p:cTn>
+                        </p:par>
+                        <p:par>
+                          <p:cTn id="12" fill="hold">
+                            <p:stCondLst>
+                              <p:cond delay="1000"/>
+                            </p:stCondLst>
+                            <p:childTnLst>
+                              <p:par>
+                                <p:cTn id="13" presetID="10" presetClass="entr" presetSubtype="0" fill="hold" grpId="0" nodeType="afterEffect">
+                                  <p:stCondLst>
+                                    <p:cond delay="0"/>
+                                  </p:stCondLst>
+                                  <p:childTnLst>
+                                    <p:set>
+                                      <p:cBhvr>
+                                        <p:cTn id="14" dur="1" fill="hold">
+                                          <p:stCondLst>
+                                            <p:cond delay="0"/>
+                                          </p:stCondLst>
+                                        </p:cTn>
+                                        <p:tgtEl>
+                                          <p:spTgt spid="3">
+                                            <p:txEl>
+                                              <p:pRg st="2" end="2"/>
+                                            </p:txEl>
+                                          </p:spTgt>
+                                        </p:tgtEl>
+                                        <p:attrNameLst>
+                                          <p:attrName>style.visibility</p:attrName>
+                                        </p:attrNameLst>
+                                      </p:cBhvr>
+                                      <p:to>
+                                        <p:strVal val="visible"/>
+                                      </p:to>
+                                    </p:set>
+                                    <p:animEffect transition="in" filter="fade">
+                                      <p:cBhvr>
+                                        <p:cTn id="15" dur="500"/>
+                                        <p:tgtEl>
+                                          <p:spTgt spid="3">
+                                            <p:txEl>
+                                              <p:pRg st="2" end="2"/>
+                                            </p:txEl>
+                                          </p:spTgt>
+                                        </p:tgtEl>
+                                      </p:cBhvr>
+                                    </p:animEffect>
+                                  </p:childTnLst>
+                                </p:cTn>
+                              </p:par>
+                            </p:childTnLst>
+                          </p:cTn>
+                        </p:par>
+                        <p:par>
+                          <p:cTn id="16" fill="hold">
+                            <p:stCondLst>
+                              <p:cond delay="1500"/>
+                            </p:stCondLst>
+                            <p:childTnLst>
+                              <p:par>
+                                <p:cTn id="17" presetID="10" presetClass="entr" presetSubtype="0" fill="hold" grpId="0" nodeType="afterEffect">
+                                  <p:stCondLst>
+                                    <p:cond delay="0"/>
+                                  </p:stCondLst>
+                                  <p:childTnLst>
+                                    <p:set>
+                                      <p:cBhvr>
+                                        <p:cTn id="18" dur="1" fill="hold">
+                                          <p:stCondLst>
+                                            <p:cond delay="0"/>
+                                          </p:stCondLst>
+                                        </p:cTn>
+                                        <p:tgtEl>
+                                          <p:spTgt spid="3">
+                                            <p:txEl>
+                                              <p:pRg st="3" end="3"/>
+                                            </p:txEl>
+                                          </p:spTgt>
+                                        </p:tgtEl>
+                                        <p:attrNameLst>
+                                          <p:attrName>style.visibility</p:attrName>
+                                        </p:attrNameLst>
+                                      </p:cBhvr>
+                                      <p:to>
+                                        <p:strVal val="visible"/>
+                                      </p:to>
+                                    </p:set>
+                                    <p:animEffect transition="in" filter="fade">
+                                      <p:cBhvr>
+                                        <p:cTn id="19" dur="500"/>
+                                        <p:tgtEl>
+                                          <p:spTgt spid="3">
+                                            <p:txEl>
+                                              <p:pRg st="3" end="3"/>
                                             </p:txEl>
                                           </p:spTgt>
                                         </p:tgtEl>
@@ -6732,7 +6855,7 @@
         <p:cNvPr id="1" name="">
           <a:extLst>
             <a:ext uri="{FF2B5EF4-FFF2-40B4-BE49-F238E27FC236}">
-              <a16:creationId xmlns:a16="http://schemas.microsoft.com/office/drawing/2014/main" id="{0420449F-8816-5ED7-31EC-A35391DEC81A}"/>
+              <a16:creationId xmlns:a16="http://schemas.microsoft.com/office/drawing/2014/main" id="{C903DE96-B4CD-BDD2-5BA0-BD4C2870AACF}"/>
             </a:ext>
           </a:extLst>
         </p:cNvPr>
@@ -6752,7 +6875,7 @@
           <p:cNvPr id="2" name="Cím 1">
             <a:extLst>
               <a:ext uri="{FF2B5EF4-FFF2-40B4-BE49-F238E27FC236}">
-                <a16:creationId xmlns:a16="http://schemas.microsoft.com/office/drawing/2014/main" id="{DDF8F96D-C2EF-A8AF-3582-CC038E3E8674}"/>
+                <a16:creationId xmlns:a16="http://schemas.microsoft.com/office/drawing/2014/main" id="{61FF2A9F-F474-F8F2-72A7-B596A78A95F6}"/>
               </a:ext>
             </a:extLst>
           </p:cNvPr>
@@ -6777,7 +6900,7 @@
           <a:p>
             <a:r>
               <a:rPr lang="hu-HU" sz="4800" b="1" noProof="0" dirty="0"/>
-              <a:t>Extra funkciók</a:t>
+              <a:t>Biztonság és adatvédelem</a:t>
             </a:r>
           </a:p>
         </p:txBody>
@@ -6787,7 +6910,7 @@
           <p:cNvPr id="3" name="Tartalom helye 2">
             <a:extLst>
               <a:ext uri="{FF2B5EF4-FFF2-40B4-BE49-F238E27FC236}">
-                <a16:creationId xmlns:a16="http://schemas.microsoft.com/office/drawing/2014/main" id="{A60CCEE9-268E-AE83-074F-FD345CE999C8}"/>
+                <a16:creationId xmlns:a16="http://schemas.microsoft.com/office/drawing/2014/main" id="{203456BF-A70F-250B-C128-3FE710683D9B}"/>
               </a:ext>
             </a:extLst>
           </p:cNvPr>
@@ -6810,15 +6933,46 @@
           </a:bodyPr>
           <a:lstStyle/>
           <a:p>
+            <a:pPr marL="0" indent="0">
+              <a:buNone/>
+            </a:pPr>
+            <a:r>
+              <a:rPr lang="hu-HU" sz="2800" b="1" dirty="0"/>
+              <a:t>Felhasználói fiókok</a:t>
+            </a:r>
+            <a:endParaRPr lang="hu-HU" sz="2800" b="1" noProof="0" dirty="0"/>
+          </a:p>
+          <a:p>
+            <a:pPr marL="0" indent="0">
+              <a:buNone/>
+            </a:pPr>
+            <a:r>
+              <a:rPr lang="hu-HU" sz="2800" dirty="0"/>
+              <a:t>A felhasználókról tárolt adatok </a:t>
+            </a:r>
+            <a:r>
+              <a:rPr lang="hu-HU" sz="2800" b="1" dirty="0"/>
+              <a:t>AES</a:t>
+            </a:r>
+            <a:r>
+              <a:rPr lang="hu-HU" sz="2800" dirty="0"/>
+              <a:t> encrypt –tel  kerülnek be az adatbázisba amihez a kulcs maga a </a:t>
+            </a:r>
+            <a:r>
+              <a:rPr lang="hu-HU" sz="2800" b="1" dirty="0"/>
+              <a:t>mesterkulcs</a:t>
+            </a:r>
+            <a:r>
+              <a:rPr lang="hu-HU" sz="2800" dirty="0"/>
+              <a:t>.</a:t>
+            </a:r>
+            <a:r>
+              <a:rPr lang="hu-HU" dirty="0"/>
+              <a:t> </a:t>
+            </a:r>
             <a:r>
               <a:rPr lang="hu-HU" sz="2800" noProof="0" dirty="0"/>
-              <a:t>Jelszó erősség </a:t>
-            </a:r>
-          </a:p>
-          <a:p>
-            <a:r>
-              <a:rPr lang="hu-HU" sz="2800" noProof="0" dirty="0"/>
-              <a:t>Jelszó generálás</a:t>
+              <a:t> </a:t>
             </a:r>
           </a:p>
         </p:txBody>
@@ -6826,7 +6980,7 @@
     </p:spTree>
     <p:extLst>
       <p:ext uri="{BB962C8B-B14F-4D97-AF65-F5344CB8AC3E}">
-        <p14:creationId xmlns:p14="http://schemas.microsoft.com/office/powerpoint/2010/main" val="1108174272"/>
+        <p14:creationId xmlns:p14="http://schemas.microsoft.com/office/powerpoint/2010/main" val="2766645718"/>
       </p:ext>
     </p:extLst>
   </p:cSld>
@@ -7011,6 +7165,288 @@
   <p:cSld>
     <p:spTree>
       <p:nvGrpSpPr>
+        <p:cNvPr id="1" name="">
+          <a:extLst>
+            <a:ext uri="{FF2B5EF4-FFF2-40B4-BE49-F238E27FC236}">
+              <a16:creationId xmlns:a16="http://schemas.microsoft.com/office/drawing/2014/main" id="{0420449F-8816-5ED7-31EC-A35391DEC81A}"/>
+            </a:ext>
+          </a:extLst>
+        </p:cNvPr>
+        <p:cNvGrpSpPr/>
+        <p:nvPr/>
+      </p:nvGrpSpPr>
+      <p:grpSpPr>
+        <a:xfrm>
+          <a:off x="0" y="0"/>
+          <a:ext cx="0" cy="0"/>
+          <a:chOff x="0" y="0"/>
+          <a:chExt cx="0" cy="0"/>
+        </a:xfrm>
+      </p:grpSpPr>
+      <p:sp>
+        <p:nvSpPr>
+          <p:cNvPr id="2" name="Cím 1">
+            <a:extLst>
+              <a:ext uri="{FF2B5EF4-FFF2-40B4-BE49-F238E27FC236}">
+                <a16:creationId xmlns:a16="http://schemas.microsoft.com/office/drawing/2014/main" id="{DDF8F96D-C2EF-A8AF-3582-CC038E3E8674}"/>
+              </a:ext>
+            </a:extLst>
+          </p:cNvPr>
+          <p:cNvSpPr>
+            <a:spLocks noGrp="1"/>
+          </p:cNvSpPr>
+          <p:nvPr>
+            <p:ph type="title"/>
+          </p:nvPr>
+        </p:nvSpPr>
+        <p:spPr>
+          <a:xfrm>
+            <a:off x="1086642" y="685800"/>
+            <a:ext cx="10018713" cy="1752599"/>
+          </a:xfrm>
+        </p:spPr>
+        <p:txBody>
+          <a:bodyPr>
+            <a:normAutofit/>
+          </a:bodyPr>
+          <a:lstStyle/>
+          <a:p>
+            <a:r>
+              <a:rPr lang="hu-HU" sz="4800" b="1" noProof="0" dirty="0"/>
+              <a:t>Extra funkciók</a:t>
+            </a:r>
+          </a:p>
+        </p:txBody>
+      </p:sp>
+      <p:sp>
+        <p:nvSpPr>
+          <p:cNvPr id="3" name="Tartalom helye 2">
+            <a:extLst>
+              <a:ext uri="{FF2B5EF4-FFF2-40B4-BE49-F238E27FC236}">
+                <a16:creationId xmlns:a16="http://schemas.microsoft.com/office/drawing/2014/main" id="{A60CCEE9-268E-AE83-074F-FD345CE999C8}"/>
+              </a:ext>
+            </a:extLst>
+          </p:cNvPr>
+          <p:cNvSpPr>
+            <a:spLocks noGrp="1"/>
+          </p:cNvSpPr>
+          <p:nvPr>
+            <p:ph idx="1"/>
+          </p:nvPr>
+        </p:nvSpPr>
+        <p:spPr>
+          <a:xfrm>
+            <a:off x="1420761" y="2438399"/>
+            <a:ext cx="9881419" cy="3618271"/>
+          </a:xfrm>
+        </p:spPr>
+        <p:txBody>
+          <a:bodyPr anchor="t">
+            <a:normAutofit/>
+          </a:bodyPr>
+          <a:lstStyle/>
+          <a:p>
+            <a:r>
+              <a:rPr lang="hu-HU" sz="2800" noProof="0" dirty="0"/>
+              <a:t>Jelszó erősség </a:t>
+            </a:r>
+          </a:p>
+          <a:p>
+            <a:r>
+              <a:rPr lang="hu-HU" sz="2800" noProof="0" dirty="0"/>
+              <a:t>Jelszó generálás</a:t>
+            </a:r>
+          </a:p>
+        </p:txBody>
+      </p:sp>
+    </p:spTree>
+    <p:extLst>
+      <p:ext uri="{BB962C8B-B14F-4D97-AF65-F5344CB8AC3E}">
+        <p14:creationId xmlns:p14="http://schemas.microsoft.com/office/powerpoint/2010/main" val="1108174272"/>
+      </p:ext>
+    </p:extLst>
+  </p:cSld>
+  <p:clrMapOvr>
+    <a:masterClrMapping/>
+  </p:clrMapOvr>
+  <mc:AlternateContent xmlns:mc="http://schemas.openxmlformats.org/markup-compatibility/2006" xmlns:p14="http://schemas.microsoft.com/office/powerpoint/2010/main">
+    <mc:Choice Requires="p14">
+      <p:transition spd="slow" p14:dur="1500">
+        <p:push dir="u"/>
+      </p:transition>
+    </mc:Choice>
+    <mc:Fallback xmlns="">
+      <p:transition spd="slow">
+        <p:push dir="u"/>
+      </p:transition>
+    </mc:Fallback>
+  </mc:AlternateContent>
+  <p:timing>
+    <p:tnLst>
+      <p:par>
+        <p:cTn id="1" dur="indefinite" restart="never" nodeType="tmRoot">
+          <p:childTnLst>
+            <p:seq concurrent="1" nextAc="seek">
+              <p:cTn id="2" dur="indefinite" nodeType="mainSeq">
+                <p:childTnLst>
+                  <p:par>
+                    <p:cTn id="3" fill="hold">
+                      <p:stCondLst>
+                        <p:cond delay="indefinite"/>
+                        <p:cond evt="onBegin" delay="0">
+                          <p:tn val="2"/>
+                        </p:cond>
+                      </p:stCondLst>
+                      <p:childTnLst>
+                        <p:par>
+                          <p:cTn id="4" fill="hold">
+                            <p:stCondLst>
+                              <p:cond delay="0"/>
+                            </p:stCondLst>
+                            <p:childTnLst>
+                              <p:par>
+                                <p:cTn id="5" presetID="10" presetClass="entr" presetSubtype="0" fill="hold" grpId="0" nodeType="afterEffect">
+                                  <p:stCondLst>
+                                    <p:cond delay="0"/>
+                                  </p:stCondLst>
+                                  <p:childTnLst>
+                                    <p:set>
+                                      <p:cBhvr>
+                                        <p:cTn id="6" dur="1" fill="hold">
+                                          <p:stCondLst>
+                                            <p:cond delay="0"/>
+                                          </p:stCondLst>
+                                        </p:cTn>
+                                        <p:tgtEl>
+                                          <p:spTgt spid="3">
+                                            <p:txEl>
+                                              <p:pRg st="0" end="0"/>
+                                            </p:txEl>
+                                          </p:spTgt>
+                                        </p:tgtEl>
+                                        <p:attrNameLst>
+                                          <p:attrName>style.visibility</p:attrName>
+                                        </p:attrNameLst>
+                                      </p:cBhvr>
+                                      <p:to>
+                                        <p:strVal val="visible"/>
+                                      </p:to>
+                                    </p:set>
+                                    <p:animEffect transition="in" filter="fade">
+                                      <p:cBhvr>
+                                        <p:cTn id="7" dur="500"/>
+                                        <p:tgtEl>
+                                          <p:spTgt spid="3">
+                                            <p:txEl>
+                                              <p:pRg st="0" end="0"/>
+                                            </p:txEl>
+                                          </p:spTgt>
+                                        </p:tgtEl>
+                                      </p:cBhvr>
+                                    </p:animEffect>
+                                  </p:childTnLst>
+                                </p:cTn>
+                              </p:par>
+                            </p:childTnLst>
+                          </p:cTn>
+                        </p:par>
+                      </p:childTnLst>
+                    </p:cTn>
+                  </p:par>
+                  <p:par>
+                    <p:cTn id="8" fill="hold">
+                      <p:stCondLst>
+                        <p:cond delay="indefinite"/>
+                      </p:stCondLst>
+                      <p:childTnLst>
+                        <p:par>
+                          <p:cTn id="9" fill="hold">
+                            <p:stCondLst>
+                              <p:cond delay="0"/>
+                            </p:stCondLst>
+                            <p:childTnLst>
+                              <p:par>
+                                <p:cTn id="10" presetID="10" presetClass="entr" presetSubtype="0" fill="hold" grpId="0" nodeType="clickEffect">
+                                  <p:stCondLst>
+                                    <p:cond delay="0"/>
+                                  </p:stCondLst>
+                                  <p:childTnLst>
+                                    <p:set>
+                                      <p:cBhvr>
+                                        <p:cTn id="11" dur="1" fill="hold">
+                                          <p:stCondLst>
+                                            <p:cond delay="0"/>
+                                          </p:stCondLst>
+                                        </p:cTn>
+                                        <p:tgtEl>
+                                          <p:spTgt spid="3">
+                                            <p:txEl>
+                                              <p:pRg st="1" end="1"/>
+                                            </p:txEl>
+                                          </p:spTgt>
+                                        </p:tgtEl>
+                                        <p:attrNameLst>
+                                          <p:attrName>style.visibility</p:attrName>
+                                        </p:attrNameLst>
+                                      </p:cBhvr>
+                                      <p:to>
+                                        <p:strVal val="visible"/>
+                                      </p:to>
+                                    </p:set>
+                                    <p:animEffect transition="in" filter="fade">
+                                      <p:cBhvr>
+                                        <p:cTn id="12" dur="500"/>
+                                        <p:tgtEl>
+                                          <p:spTgt spid="3">
+                                            <p:txEl>
+                                              <p:pRg st="1" end="1"/>
+                                            </p:txEl>
+                                          </p:spTgt>
+                                        </p:tgtEl>
+                                      </p:cBhvr>
+                                    </p:animEffect>
+                                  </p:childTnLst>
+                                </p:cTn>
+                              </p:par>
+                            </p:childTnLst>
+                          </p:cTn>
+                        </p:par>
+                      </p:childTnLst>
+                    </p:cTn>
+                  </p:par>
+                </p:childTnLst>
+              </p:cTn>
+              <p:prevCondLst>
+                <p:cond evt="onPrev" delay="0">
+                  <p:tgtEl>
+                    <p:sldTgt/>
+                  </p:tgtEl>
+                </p:cond>
+              </p:prevCondLst>
+              <p:nextCondLst>
+                <p:cond evt="onNext" delay="0">
+                  <p:tgtEl>
+                    <p:sldTgt/>
+                  </p:tgtEl>
+                </p:cond>
+              </p:nextCondLst>
+            </p:seq>
+          </p:childTnLst>
+        </p:cTn>
+      </p:par>
+    </p:tnLst>
+    <p:bldLst>
+      <p:bldP spid="3" grpId="0" build="p"/>
+    </p:bldLst>
+  </p:timing>
+</p:sld>
+</file>
+
+<file path=ppt/slides/slide13.xml><?xml version="1.0" encoding="utf-8"?>
+<p:sld xmlns:a="http://schemas.openxmlformats.org/drawingml/2006/main" xmlns:r="http://schemas.openxmlformats.org/officeDocument/2006/relationships" xmlns:p="http://schemas.openxmlformats.org/presentationml/2006/main">
+  <p:cSld>
+    <p:spTree>
+      <p:nvGrpSpPr>
         <p:cNvPr id="1" name=""/>
         <p:cNvGrpSpPr/>
         <p:nvPr/>
@@ -7287,7 +7723,7 @@
 </p:sld>
 </file>
 
-<file path=ppt/slides/slide13.xml><?xml version="1.0" encoding="utf-8"?>
+<file path=ppt/slides/slide14.xml><?xml version="1.0" encoding="utf-8"?>
 <p:sld xmlns:a="http://schemas.openxmlformats.org/drawingml/2006/main" xmlns:r="http://schemas.openxmlformats.org/officeDocument/2006/relationships" xmlns:p="http://schemas.openxmlformats.org/presentationml/2006/main">
   <p:cSld>
     <p:spTree>
@@ -8911,8 +9347,8 @@
         </p:blipFill>
         <p:spPr>
           <a:xfrm>
-            <a:off x="1158922" y="3429000"/>
-            <a:ext cx="10669489" cy="2581635"/>
+            <a:off x="1086643" y="3429000"/>
+            <a:ext cx="10018713" cy="2581635"/>
           </a:xfrm>
           <a:prstGeom prst="rect">
             <a:avLst/>
@@ -8933,6 +9369,108 @@
 </file>
 
 <file path=ppt/slides/slide6.xml><?xml version="1.0" encoding="utf-8"?>
+<p:sld xmlns:a="http://schemas.openxmlformats.org/drawingml/2006/main" xmlns:r="http://schemas.openxmlformats.org/officeDocument/2006/relationships" xmlns:p="http://schemas.openxmlformats.org/presentationml/2006/main">
+  <p:cSld>
+    <p:spTree>
+      <p:nvGrpSpPr>
+        <p:cNvPr id="1" name="">
+          <a:extLst>
+            <a:ext uri="{FF2B5EF4-FFF2-40B4-BE49-F238E27FC236}">
+              <a16:creationId xmlns:a16="http://schemas.microsoft.com/office/drawing/2014/main" id="{39C45BD8-E45E-0F70-8BF0-6A2236D83CE2}"/>
+            </a:ext>
+          </a:extLst>
+        </p:cNvPr>
+        <p:cNvGrpSpPr/>
+        <p:nvPr/>
+      </p:nvGrpSpPr>
+      <p:grpSpPr>
+        <a:xfrm>
+          <a:off x="0" y="0"/>
+          <a:ext cx="0" cy="0"/>
+          <a:chOff x="0" y="0"/>
+          <a:chExt cx="0" cy="0"/>
+        </a:xfrm>
+      </p:grpSpPr>
+      <p:sp>
+        <p:nvSpPr>
+          <p:cNvPr id="2" name="Title 1">
+            <a:extLst>
+              <a:ext uri="{FF2B5EF4-FFF2-40B4-BE49-F238E27FC236}">
+                <a16:creationId xmlns:a16="http://schemas.microsoft.com/office/drawing/2014/main" id="{96E1E0DE-3768-A1A0-464D-B12E0D8ED285}"/>
+              </a:ext>
+            </a:extLst>
+          </p:cNvPr>
+          <p:cNvSpPr>
+            <a:spLocks noGrp="1"/>
+          </p:cNvSpPr>
+          <p:nvPr>
+            <p:ph type="title"/>
+          </p:nvPr>
+        </p:nvSpPr>
+        <p:spPr/>
+        <p:txBody>
+          <a:bodyPr>
+            <a:normAutofit/>
+          </a:bodyPr>
+          <a:lstStyle/>
+          <a:p>
+            <a:r>
+              <a:rPr lang="hu-HU" sz="4800" b="1" noProof="0" dirty="0"/>
+              <a:t>Fejlesztési folyamat</a:t>
+            </a:r>
+          </a:p>
+        </p:txBody>
+      </p:sp>
+      <p:pic>
+        <p:nvPicPr>
+          <p:cNvPr id="8" name="Picture 7" descr="A screenshot of a computer&#10;&#10;AI-generated content may be incorrect.">
+            <a:extLst>
+              <a:ext uri="{FF2B5EF4-FFF2-40B4-BE49-F238E27FC236}">
+                <a16:creationId xmlns:a16="http://schemas.microsoft.com/office/drawing/2014/main" id="{875FF762-90E0-2D97-A86B-C83F9EBBBF7F}"/>
+              </a:ext>
+            </a:extLst>
+          </p:cNvPr>
+          <p:cNvPicPr>
+            <a:picLocks noChangeAspect="1"/>
+          </p:cNvPicPr>
+          <p:nvPr/>
+        </p:nvPicPr>
+        <p:blipFill>
+          <a:blip r:embed="rId2">
+            <a:extLst>
+              <a:ext uri="{28A0092B-C50C-407E-A947-70E740481C1C}">
+                <a14:useLocalDpi xmlns:a14="http://schemas.microsoft.com/office/drawing/2010/main" val="0"/>
+              </a:ext>
+            </a:extLst>
+          </a:blip>
+          <a:stretch>
+            <a:fillRect/>
+          </a:stretch>
+        </p:blipFill>
+        <p:spPr>
+          <a:xfrm>
+            <a:off x="457200" y="2282609"/>
+            <a:ext cx="11277600" cy="3345051"/>
+          </a:xfrm>
+          <a:prstGeom prst="rect">
+            <a:avLst/>
+          </a:prstGeom>
+        </p:spPr>
+      </p:pic>
+    </p:spTree>
+    <p:extLst>
+      <p:ext uri="{BB962C8B-B14F-4D97-AF65-F5344CB8AC3E}">
+        <p14:creationId xmlns:p14="http://schemas.microsoft.com/office/powerpoint/2010/main" val="2395014236"/>
+      </p:ext>
+    </p:extLst>
+  </p:cSld>
+  <p:clrMapOvr>
+    <a:masterClrMapping/>
+  </p:clrMapOvr>
+</p:sld>
+</file>
+
+<file path=ppt/slides/slide7.xml><?xml version="1.0" encoding="utf-8"?>
 <p:sld xmlns:a="http://schemas.openxmlformats.org/drawingml/2006/main" xmlns:r="http://schemas.openxmlformats.org/officeDocument/2006/relationships" xmlns:p="http://schemas.openxmlformats.org/presentationml/2006/main">
   <p:cSld>
     <p:spTree>
@@ -9011,10 +9549,10 @@
       </p:pic>
       <p:pic>
         <p:nvPicPr>
-          <p:cNvPr id="11" name="Picture 10">
+          <p:cNvPr id="4" name="Picture 3">
             <a:extLst>
               <a:ext uri="{FF2B5EF4-FFF2-40B4-BE49-F238E27FC236}">
-                <a16:creationId xmlns:a16="http://schemas.microsoft.com/office/drawing/2014/main" id="{551AC55A-B9EA-A11A-96DC-4C05D9F03AFF}"/>
+                <a16:creationId xmlns:a16="http://schemas.microsoft.com/office/drawing/2014/main" id="{17DAC05D-D666-D833-06D0-8E56B92EEF7A}"/>
               </a:ext>
             </a:extLst>
           </p:cNvPr>
@@ -9031,8 +9569,8 @@
         </p:blipFill>
         <p:spPr>
           <a:xfrm>
-            <a:off x="5413115" y="2438397"/>
-            <a:ext cx="6413251" cy="2408905"/>
+            <a:off x="5059431" y="2436894"/>
+            <a:ext cx="6766935" cy="2407401"/>
           </a:xfrm>
           <a:prstGeom prst="rect">
             <a:avLst/>
@@ -9064,7 +9602,7 @@
 </p:sld>
 </file>
 
-<file path=ppt/slides/slide7.xml><?xml version="1.0" encoding="utf-8"?>
+<file path=ppt/slides/slide8.xml><?xml version="1.0" encoding="utf-8"?>
 <p:sld xmlns:a="http://schemas.openxmlformats.org/drawingml/2006/main" xmlns:r="http://schemas.openxmlformats.org/officeDocument/2006/relationships" xmlns:p="http://schemas.openxmlformats.org/presentationml/2006/main">
   <p:cSld>
     <p:spTree>
@@ -9213,7 +9751,7 @@
 </p:sld>
 </file>
 
-<file path=ppt/slides/slide8.xml><?xml version="1.0" encoding="utf-8"?>
+<file path=ppt/slides/slide9.xml><?xml version="1.0" encoding="utf-8"?>
 <p:sld xmlns:a="http://schemas.openxmlformats.org/drawingml/2006/main" xmlns:r="http://schemas.openxmlformats.org/officeDocument/2006/relationships" xmlns:p="http://schemas.openxmlformats.org/presentationml/2006/main">
   <p:cSld>
     <p:spTree>
@@ -9352,10 +9890,10 @@
       </p:sp>
       <p:pic>
         <p:nvPicPr>
-          <p:cNvPr id="4" name="Picture 3">
+          <p:cNvPr id="5" name="Picture 4">
             <a:extLst>
               <a:ext uri="{FF2B5EF4-FFF2-40B4-BE49-F238E27FC236}">
-                <a16:creationId xmlns:a16="http://schemas.microsoft.com/office/drawing/2014/main" id="{B8B81A20-59BE-C228-1C7D-8A9AF0140078}"/>
+                <a16:creationId xmlns:a16="http://schemas.microsoft.com/office/drawing/2014/main" id="{19A8AF68-7871-88E4-02C5-F8068B10A764}"/>
               </a:ext>
             </a:extLst>
           </p:cNvPr>
@@ -9372,8 +9910,8 @@
         </p:blipFill>
         <p:spPr>
           <a:xfrm>
-            <a:off x="102500" y="1654191"/>
-            <a:ext cx="7798460" cy="4628417"/>
+            <a:off x="266183" y="1617320"/>
+            <a:ext cx="7773280" cy="4154215"/>
           </a:xfrm>
           <a:prstGeom prst="rect">
             <a:avLst/>
@@ -9402,441 +9940,6 @@
       </p:transition>
     </mc:Fallback>
   </mc:AlternateContent>
-</p:sld>
-</file>
-
-<file path=ppt/slides/slide9.xml><?xml version="1.0" encoding="utf-8"?>
-<p:sld xmlns:a="http://schemas.openxmlformats.org/drawingml/2006/main" xmlns:r="http://schemas.openxmlformats.org/officeDocument/2006/relationships" xmlns:p="http://schemas.openxmlformats.org/presentationml/2006/main">
-  <p:cSld>
-    <p:spTree>
-      <p:nvGrpSpPr>
-        <p:cNvPr id="1" name=""/>
-        <p:cNvGrpSpPr/>
-        <p:nvPr/>
-      </p:nvGrpSpPr>
-      <p:grpSpPr>
-        <a:xfrm>
-          <a:off x="0" y="0"/>
-          <a:ext cx="0" cy="0"/>
-          <a:chOff x="0" y="0"/>
-          <a:chExt cx="0" cy="0"/>
-        </a:xfrm>
-      </p:grpSpPr>
-      <p:sp>
-        <p:nvSpPr>
-          <p:cNvPr id="2" name="Cím 1">
-            <a:extLst>
-              <a:ext uri="{FF2B5EF4-FFF2-40B4-BE49-F238E27FC236}">
-                <a16:creationId xmlns:a16="http://schemas.microsoft.com/office/drawing/2014/main" id="{E2BE7F50-CA2D-1C18-13B0-CEF53888A230}"/>
-              </a:ext>
-            </a:extLst>
-          </p:cNvPr>
-          <p:cNvSpPr>
-            <a:spLocks noGrp="1"/>
-          </p:cNvSpPr>
-          <p:nvPr>
-            <p:ph type="title"/>
-          </p:nvPr>
-        </p:nvSpPr>
-        <p:spPr>
-          <a:xfrm>
-            <a:off x="1086642" y="685800"/>
-            <a:ext cx="10018713" cy="1752599"/>
-          </a:xfrm>
-        </p:spPr>
-        <p:txBody>
-          <a:bodyPr>
-            <a:normAutofit/>
-          </a:bodyPr>
-          <a:lstStyle/>
-          <a:p>
-            <a:r>
-              <a:rPr lang="hu-HU" sz="4800" b="1" noProof="0" dirty="0"/>
-              <a:t>Biztonság és adatvédelem</a:t>
-            </a:r>
-          </a:p>
-        </p:txBody>
-      </p:sp>
-      <p:sp>
-        <p:nvSpPr>
-          <p:cNvPr id="3" name="Tartalom helye 2">
-            <a:extLst>
-              <a:ext uri="{FF2B5EF4-FFF2-40B4-BE49-F238E27FC236}">
-                <a16:creationId xmlns:a16="http://schemas.microsoft.com/office/drawing/2014/main" id="{C3401062-2977-BEA7-4528-A2223E6294F9}"/>
-              </a:ext>
-            </a:extLst>
-          </p:cNvPr>
-          <p:cNvSpPr>
-            <a:spLocks noGrp="1"/>
-          </p:cNvSpPr>
-          <p:nvPr>
-            <p:ph idx="1"/>
-          </p:nvPr>
-        </p:nvSpPr>
-        <p:spPr>
-          <a:xfrm>
-            <a:off x="1420761" y="2438399"/>
-            <a:ext cx="9881419" cy="3618271"/>
-          </a:xfrm>
-        </p:spPr>
-        <p:txBody>
-          <a:bodyPr anchor="t">
-            <a:normAutofit/>
-          </a:bodyPr>
-          <a:lstStyle/>
-          <a:p>
-            <a:pPr marL="0" indent="0">
-              <a:buNone/>
-            </a:pPr>
-            <a:r>
-              <a:rPr lang="hu-HU" sz="2800" b="1" noProof="0" dirty="0"/>
-              <a:t>Bejelentkezés</a:t>
-            </a:r>
-          </a:p>
-          <a:p>
-            <a:pPr marL="0" indent="0">
-              <a:buNone/>
-            </a:pPr>
-            <a:r>
-              <a:rPr lang="hu-HU" sz="2800" dirty="0"/>
-              <a:t>Az Aliasly használatához szükséges egy </a:t>
-            </a:r>
-            <a:r>
-              <a:rPr lang="hu-HU" sz="2800" b="1" dirty="0"/>
-              <a:t>egyedi mesterkulcs</a:t>
-            </a:r>
-            <a:r>
-              <a:rPr lang="hu-HU" sz="2800" dirty="0"/>
-              <a:t>, amelyet ön határoz meg és hozhat létre az alkalmazás belépő felületén. </a:t>
-            </a:r>
-          </a:p>
-          <a:p>
-            <a:pPr marL="0" indent="0">
-              <a:buNone/>
-            </a:pPr>
-            <a:r>
-              <a:rPr lang="hu-HU" sz="2800" noProof="0" dirty="0"/>
-              <a:t>A </a:t>
-            </a:r>
-            <a:r>
-              <a:rPr lang="hu-HU" sz="2800" b="1" noProof="0" dirty="0"/>
-              <a:t>mesterkulcshoz</a:t>
-            </a:r>
-            <a:r>
-              <a:rPr lang="hu-HU" sz="2800" noProof="0" dirty="0"/>
-              <a:t> vannak rendelve a </a:t>
-            </a:r>
-            <a:r>
-              <a:rPr lang="hu-HU" sz="2800" b="1" noProof="0" dirty="0"/>
-              <a:t>felhasználói fiókok</a:t>
-            </a:r>
-            <a:r>
-              <a:rPr lang="hu-HU" sz="2800" noProof="0" dirty="0"/>
-              <a:t>.</a:t>
-            </a:r>
-          </a:p>
-          <a:p>
-            <a:pPr marL="0" indent="0">
-              <a:buNone/>
-            </a:pPr>
-            <a:r>
-              <a:rPr lang="hu-HU" sz="2800" dirty="0"/>
-              <a:t>A </a:t>
-            </a:r>
-            <a:r>
-              <a:rPr lang="hu-HU" sz="2800" b="1" dirty="0"/>
-              <a:t>mesterkulcsot</a:t>
-            </a:r>
-            <a:r>
-              <a:rPr lang="hu-HU" sz="2800" dirty="0"/>
-              <a:t> MD5 + Salting kombinációjával hasheljük.</a:t>
-            </a:r>
-            <a:r>
-              <a:rPr lang="hu-HU" dirty="0"/>
-              <a:t> </a:t>
-            </a:r>
-            <a:r>
-              <a:rPr lang="hu-HU" sz="2800" noProof="0" dirty="0"/>
-              <a:t> </a:t>
-            </a:r>
-          </a:p>
-        </p:txBody>
-      </p:sp>
-    </p:spTree>
-    <p:extLst>
-      <p:ext uri="{BB962C8B-B14F-4D97-AF65-F5344CB8AC3E}">
-        <p14:creationId xmlns:p14="http://schemas.microsoft.com/office/powerpoint/2010/main" val="2872949862"/>
-      </p:ext>
-    </p:extLst>
-  </p:cSld>
-  <p:clrMapOvr>
-    <a:masterClrMapping/>
-  </p:clrMapOvr>
-  <mc:AlternateContent xmlns:mc="http://schemas.openxmlformats.org/markup-compatibility/2006" xmlns:p14="http://schemas.microsoft.com/office/powerpoint/2010/main">
-    <mc:Choice Requires="p14">
-      <p:transition spd="slow" p14:dur="1500">
-        <p:push dir="u"/>
-      </p:transition>
-    </mc:Choice>
-    <mc:Fallback xmlns="">
-      <p:transition spd="slow">
-        <p:push dir="u"/>
-      </p:transition>
-    </mc:Fallback>
-  </mc:AlternateContent>
-  <p:timing>
-    <p:tnLst>
-      <p:par>
-        <p:cTn id="1" dur="indefinite" restart="never" nodeType="tmRoot">
-          <p:childTnLst>
-            <p:seq concurrent="1" nextAc="seek">
-              <p:cTn id="2" dur="indefinite" nodeType="mainSeq">
-                <p:childTnLst>
-                  <p:par>
-                    <p:cTn id="3" fill="hold">
-                      <p:stCondLst>
-                        <p:cond delay="indefinite"/>
-                        <p:cond evt="onBegin" delay="0">
-                          <p:tn val="2"/>
-                        </p:cond>
-                      </p:stCondLst>
-                      <p:childTnLst>
-                        <p:par>
-                          <p:cTn id="4" fill="hold">
-                            <p:stCondLst>
-                              <p:cond delay="0"/>
-                            </p:stCondLst>
-                            <p:childTnLst>
-                              <p:par>
-                                <p:cTn id="5" presetID="10" presetClass="entr" presetSubtype="0" fill="hold" grpId="0" nodeType="afterEffect">
-                                  <p:stCondLst>
-                                    <p:cond delay="0"/>
-                                  </p:stCondLst>
-                                  <p:childTnLst>
-                                    <p:set>
-                                      <p:cBhvr>
-                                        <p:cTn id="6" dur="1" fill="hold">
-                                          <p:stCondLst>
-                                            <p:cond delay="0"/>
-                                          </p:stCondLst>
-                                        </p:cTn>
-                                        <p:tgtEl>
-                                          <p:spTgt spid="3">
-                                            <p:txEl>
-                                              <p:pRg st="0" end="0"/>
-                                            </p:txEl>
-                                          </p:spTgt>
-                                        </p:tgtEl>
-                                        <p:attrNameLst>
-                                          <p:attrName>style.visibility</p:attrName>
-                                        </p:attrNameLst>
-                                      </p:cBhvr>
-                                      <p:to>
-                                        <p:strVal val="visible"/>
-                                      </p:to>
-                                    </p:set>
-                                    <p:animEffect transition="in" filter="fade">
-                                      <p:cBhvr>
-                                        <p:cTn id="7" dur="500"/>
-                                        <p:tgtEl>
-                                          <p:spTgt spid="3">
-                                            <p:txEl>
-                                              <p:pRg st="0" end="0"/>
-                                            </p:txEl>
-                                          </p:spTgt>
-                                        </p:tgtEl>
-                                      </p:cBhvr>
-                                    </p:animEffect>
-                                  </p:childTnLst>
-                                </p:cTn>
-                              </p:par>
-                            </p:childTnLst>
-                          </p:cTn>
-                        </p:par>
-                        <p:par>
-                          <p:cTn id="8" fill="hold">
-                            <p:stCondLst>
-                              <p:cond delay="500"/>
-                            </p:stCondLst>
-                            <p:childTnLst>
-                              <p:par>
-                                <p:cTn id="9" presetID="10" presetClass="entr" presetSubtype="0" fill="hold" grpId="0" nodeType="afterEffect">
-                                  <p:stCondLst>
-                                    <p:cond delay="0"/>
-                                  </p:stCondLst>
-                                  <p:childTnLst>
-                                    <p:set>
-                                      <p:cBhvr>
-                                        <p:cTn id="10" dur="1" fill="hold">
-                                          <p:stCondLst>
-                                            <p:cond delay="0"/>
-                                          </p:stCondLst>
-                                        </p:cTn>
-                                        <p:tgtEl>
-                                          <p:spTgt spid="3">
-                                            <p:txEl>
-                                              <p:pRg st="1" end="1"/>
-                                            </p:txEl>
-                                          </p:spTgt>
-                                        </p:tgtEl>
-                                        <p:attrNameLst>
-                                          <p:attrName>style.visibility</p:attrName>
-                                        </p:attrNameLst>
-                                      </p:cBhvr>
-                                      <p:to>
-                                        <p:strVal val="visible"/>
-                                      </p:to>
-                                    </p:set>
-                                    <p:animEffect transition="in" filter="fade">
-                                      <p:cBhvr>
-                                        <p:cTn id="11" dur="500"/>
-                                        <p:tgtEl>
-                                          <p:spTgt spid="3">
-                                            <p:txEl>
-                                              <p:pRg st="1" end="1"/>
-                                            </p:txEl>
-                                          </p:spTgt>
-                                        </p:tgtEl>
-                                      </p:cBhvr>
-                                    </p:animEffect>
-                                  </p:childTnLst>
-                                </p:cTn>
-                              </p:par>
-                            </p:childTnLst>
-                          </p:cTn>
-                        </p:par>
-                        <p:par>
-                          <p:cTn id="12" fill="hold">
-                            <p:stCondLst>
-                              <p:cond delay="1000"/>
-                            </p:stCondLst>
-                            <p:childTnLst>
-                              <p:par>
-                                <p:cTn id="13" presetID="10" presetClass="entr" presetSubtype="0" fill="hold" grpId="0" nodeType="afterEffect">
-                                  <p:stCondLst>
-                                    <p:cond delay="0"/>
-                                  </p:stCondLst>
-                                  <p:childTnLst>
-                                    <p:set>
-                                      <p:cBhvr>
-                                        <p:cTn id="14" dur="1" fill="hold">
-                                          <p:stCondLst>
-                                            <p:cond delay="0"/>
-                                          </p:stCondLst>
-                                        </p:cTn>
-                                        <p:tgtEl>
-                                          <p:spTgt spid="3">
-                                            <p:txEl>
-                                              <p:pRg st="2" end="2"/>
-                                            </p:txEl>
-                                          </p:spTgt>
-                                        </p:tgtEl>
-                                        <p:attrNameLst>
-                                          <p:attrName>style.visibility</p:attrName>
-                                        </p:attrNameLst>
-                                      </p:cBhvr>
-                                      <p:to>
-                                        <p:strVal val="visible"/>
-                                      </p:to>
-                                    </p:set>
-                                    <p:animEffect transition="in" filter="fade">
-                                      <p:cBhvr>
-                                        <p:cTn id="15" dur="500"/>
-                                        <p:tgtEl>
-                                          <p:spTgt spid="3">
-                                            <p:txEl>
-                                              <p:pRg st="2" end="2"/>
-                                            </p:txEl>
-                                          </p:spTgt>
-                                        </p:tgtEl>
-                                      </p:cBhvr>
-                                    </p:animEffect>
-                                  </p:childTnLst>
-                                </p:cTn>
-                              </p:par>
-                            </p:childTnLst>
-                          </p:cTn>
-                        </p:par>
-                        <p:par>
-                          <p:cTn id="16" fill="hold">
-                            <p:stCondLst>
-                              <p:cond delay="1500"/>
-                            </p:stCondLst>
-                            <p:childTnLst>
-                              <p:par>
-                                <p:cTn id="17" presetID="10" presetClass="entr" presetSubtype="0" fill="hold" grpId="0" nodeType="afterEffect">
-                                  <p:stCondLst>
-                                    <p:cond delay="0"/>
-                                  </p:stCondLst>
-                                  <p:childTnLst>
-                                    <p:set>
-                                      <p:cBhvr>
-                                        <p:cTn id="18" dur="1" fill="hold">
-                                          <p:stCondLst>
-                                            <p:cond delay="0"/>
-                                          </p:stCondLst>
-                                        </p:cTn>
-                                        <p:tgtEl>
-                                          <p:spTgt spid="3">
-                                            <p:txEl>
-                                              <p:pRg st="3" end="3"/>
-                                            </p:txEl>
-                                          </p:spTgt>
-                                        </p:tgtEl>
-                                        <p:attrNameLst>
-                                          <p:attrName>style.visibility</p:attrName>
-                                        </p:attrNameLst>
-                                      </p:cBhvr>
-                                      <p:to>
-                                        <p:strVal val="visible"/>
-                                      </p:to>
-                                    </p:set>
-                                    <p:animEffect transition="in" filter="fade">
-                                      <p:cBhvr>
-                                        <p:cTn id="19" dur="500"/>
-                                        <p:tgtEl>
-                                          <p:spTgt spid="3">
-                                            <p:txEl>
-                                              <p:pRg st="3" end="3"/>
-                                            </p:txEl>
-                                          </p:spTgt>
-                                        </p:tgtEl>
-                                      </p:cBhvr>
-                                    </p:animEffect>
-                                  </p:childTnLst>
-                                </p:cTn>
-                              </p:par>
-                            </p:childTnLst>
-                          </p:cTn>
-                        </p:par>
-                      </p:childTnLst>
-                    </p:cTn>
-                  </p:par>
-                </p:childTnLst>
-              </p:cTn>
-              <p:prevCondLst>
-                <p:cond evt="onPrev" delay="0">
-                  <p:tgtEl>
-                    <p:sldTgt/>
-                  </p:tgtEl>
-                </p:cond>
-              </p:prevCondLst>
-              <p:nextCondLst>
-                <p:cond evt="onNext" delay="0">
-                  <p:tgtEl>
-                    <p:sldTgt/>
-                  </p:tgtEl>
-                </p:cond>
-              </p:nextCondLst>
-            </p:seq>
-          </p:childTnLst>
-        </p:cTn>
-      </p:par>
-    </p:tnLst>
-    <p:bldLst>
-      <p:bldP spid="3" grpId="0" build="p"/>
-    </p:bldLst>
-  </p:timing>
 </p:sld>
 </file>
 

</xml_diff>